<commit_message>
Supported KSZ8081MNX Ethernet PHY.
</commit_message>
<xml_diff>
--- a/Mango-M32F2/9강_ETHERNET_테스트/9강_ETHERNET_테스트.pptx
+++ b/Mango-M32F2/9강_ETHERNET_테스트/9강_ETHERNET_테스트.pptx
@@ -5,7 +5,7 @@
     <p:sldMasterId id="2147483648" r:id="rId1"/>
   </p:sldMasterIdLst>
   <p:notesMasterIdLst>
-    <p:notesMasterId r:id="rId15"/>
+    <p:notesMasterId r:id="rId17"/>
   </p:notesMasterIdLst>
   <p:sldIdLst>
     <p:sldId id="256" r:id="rId2"/>
@@ -13,41 +13,43 @@
     <p:sldId id="965" r:id="rId4"/>
     <p:sldId id="968" r:id="rId5"/>
     <p:sldId id="980" r:id="rId6"/>
-    <p:sldId id="976" r:id="rId7"/>
-    <p:sldId id="983" r:id="rId8"/>
-    <p:sldId id="979" r:id="rId9"/>
-    <p:sldId id="982" r:id="rId10"/>
-    <p:sldId id="985" r:id="rId11"/>
-    <p:sldId id="984" r:id="rId12"/>
-    <p:sldId id="986" r:id="rId13"/>
-    <p:sldId id="959" r:id="rId14"/>
+    <p:sldId id="987" r:id="rId7"/>
+    <p:sldId id="988" r:id="rId8"/>
+    <p:sldId id="976" r:id="rId9"/>
+    <p:sldId id="983" r:id="rId10"/>
+    <p:sldId id="979" r:id="rId11"/>
+    <p:sldId id="982" r:id="rId12"/>
+    <p:sldId id="985" r:id="rId13"/>
+    <p:sldId id="984" r:id="rId14"/>
+    <p:sldId id="986" r:id="rId15"/>
+    <p:sldId id="959" r:id="rId16"/>
   </p:sldIdLst>
   <p:sldSz cx="9144000" cy="6858000" type="screen4x3"/>
   <p:notesSz cx="6858000" cy="9144000"/>
   <p:embeddedFontLst>
     <p:embeddedFont>
       <p:font typeface="나눔바른고딕" panose="020B0600000101010101" charset="-127"/>
-      <p:regular r:id="rId16"/>
-      <p:bold r:id="rId17"/>
+      <p:regular r:id="rId18"/>
+      <p:bold r:id="rId19"/>
     </p:embeddedFont>
     <p:embeddedFont>
       <p:font typeface="Consolas" panose="020B0609020204030204" pitchFamily="49" charset="0"/>
-      <p:regular r:id="rId18"/>
-      <p:bold r:id="rId19"/>
-      <p:italic r:id="rId20"/>
-      <p:boldItalic r:id="rId21"/>
+      <p:regular r:id="rId20"/>
+      <p:bold r:id="rId21"/>
+      <p:italic r:id="rId22"/>
+      <p:boldItalic r:id="rId23"/>
     </p:embeddedFont>
     <p:embeddedFont>
-      <p:font typeface="Helvetica" panose="020B0604020202020204" pitchFamily="34" charset="0"/>
-      <p:regular r:id="rId22"/>
-      <p:bold r:id="rId23"/>
-      <p:italic r:id="rId24"/>
-      <p:boldItalic r:id="rId25"/>
+      <p:font typeface="Helvetica" panose="020B0604020202020204"/>
+      <p:regular r:id="rId24"/>
+      <p:bold r:id="rId25"/>
+      <p:italic r:id="rId26"/>
+      <p:boldItalic r:id="rId27"/>
     </p:embeddedFont>
     <p:embeddedFont>
       <p:font typeface="맑은 고딕" panose="020B0503020000020004" pitchFamily="50" charset="-127"/>
-      <p:regular r:id="rId26"/>
-      <p:bold r:id="rId27"/>
+      <p:regular r:id="rId28"/>
+      <p:bold r:id="rId29"/>
     </p:embeddedFont>
   </p:embeddedFontLst>
   <p:defaultTextStyle>
@@ -301,7 +303,7 @@
             <a:fld id="{F34D2E75-A153-48C8-96AA-ACDAC809E906}" type="datetimeFigureOut">
               <a:rPr lang="ko-KR" altLang="en-US" smtClean="0"/>
               <a:pPr/>
-              <a:t>2023-10-25</a:t>
+              <a:t>2025-06-30</a:t>
             </a:fld>
             <a:endParaRPr lang="ko-KR" altLang="en-US" dirty="0"/>
           </a:p>
@@ -3037,6 +3039,552 @@
           <a:lstStyle/>
           <a:p>
             <a:r>
+              <a:rPr lang="en-US" altLang="ko-KR" sz="1400" dirty="0"/>
+              <a:t>Code </a:t>
+            </a:r>
+            <a:r>
+              <a:rPr lang="ko-KR" altLang="en-US" sz="1400" dirty="0"/>
+              <a:t>생성 후 </a:t>
+            </a:r>
+            <a:r>
+              <a:rPr lang="en-US" altLang="ko-KR" sz="1400" dirty="0" err="1"/>
+              <a:t>main.c</a:t>
+            </a:r>
+            <a:r>
+              <a:rPr lang="en-US" altLang="ko-KR" sz="1400" dirty="0"/>
+              <a:t> </a:t>
+            </a:r>
+            <a:r>
+              <a:rPr lang="ko-KR" altLang="en-US" sz="1400" dirty="0"/>
+              <a:t>수정 </a:t>
+            </a:r>
+            <a:r>
+              <a:rPr lang="en-US" altLang="ko-KR" sz="1400" dirty="0"/>
+              <a:t>- header</a:t>
+            </a:r>
+            <a:r>
+              <a:rPr lang="ko-KR" altLang="en-US" sz="1400" dirty="0"/>
+              <a:t>추가</a:t>
+            </a:r>
+            <a:r>
+              <a:rPr lang="en-US" altLang="ko-KR" sz="1400" dirty="0"/>
+              <a:t>.</a:t>
+            </a:r>
+          </a:p>
+          <a:p>
+            <a:r>
+              <a:rPr lang="en-US" altLang="ko-KR" sz="1400" dirty="0" err="1"/>
+              <a:t>httpd_init</a:t>
+            </a:r>
+            <a:r>
+              <a:rPr lang="en-US" altLang="ko-KR" sz="1400" dirty="0"/>
+              <a:t>() / </a:t>
+            </a:r>
+            <a:r>
+              <a:rPr lang="en-US" altLang="ko-KR" sz="1400" dirty="0" err="1"/>
+              <a:t>MX_LWIP_Process</a:t>
+            </a:r>
+            <a:r>
+              <a:rPr lang="en-US" altLang="ko-KR" sz="1400" dirty="0"/>
+              <a:t>()</a:t>
+            </a:r>
+            <a:r>
+              <a:rPr lang="ko-KR" altLang="en-US" sz="1400" dirty="0"/>
+              <a:t>호출 추가</a:t>
+            </a:r>
+            <a:endParaRPr lang="en-US" altLang="ko-KR" sz="1400" dirty="0"/>
+          </a:p>
+          <a:p>
+            <a:pPr marL="417513" lvl="2" indent="0">
+              <a:spcBef>
+                <a:spcPts val="0"/>
+              </a:spcBef>
+              <a:buNone/>
+            </a:pPr>
+            <a:endParaRPr lang="en-US" altLang="ko-KR" sz="900" dirty="0">
+              <a:solidFill>
+                <a:srgbClr val="000000"/>
+              </a:solidFill>
+              <a:latin typeface="Consolas" panose="020B0609020204030204" pitchFamily="49" charset="0"/>
+            </a:endParaRPr>
+          </a:p>
+          <a:p>
+            <a:pPr marL="417513" lvl="2" indent="0">
+              <a:spcBef>
+                <a:spcPts val="0"/>
+              </a:spcBef>
+              <a:buNone/>
+            </a:pPr>
+            <a:br>
+              <a:rPr lang="en-US" altLang="ko-KR" sz="900" dirty="0">
+                <a:solidFill>
+                  <a:srgbClr val="000000"/>
+                </a:solidFill>
+                <a:effectLst/>
+                <a:latin typeface="Consolas" panose="020B0609020204030204" pitchFamily="49" charset="0"/>
+              </a:rPr>
+            </a:br>
+            <a:endParaRPr lang="en-US" altLang="ko-KR" sz="900" dirty="0">
+              <a:solidFill>
+                <a:srgbClr val="000000"/>
+              </a:solidFill>
+              <a:effectLst/>
+              <a:latin typeface="Consolas" panose="020B0609020204030204" pitchFamily="49" charset="0"/>
+            </a:endParaRPr>
+          </a:p>
+          <a:p>
+            <a:endParaRPr lang="en-US" altLang="ko-KR" sz="2000" dirty="0"/>
+          </a:p>
+        </p:txBody>
+      </p:sp>
+      <p:pic>
+        <p:nvPicPr>
+          <p:cNvPr id="6" name="그림 5">
+            <a:extLst>
+              <a:ext uri="{FF2B5EF4-FFF2-40B4-BE49-F238E27FC236}">
+                <a16:creationId xmlns:a16="http://schemas.microsoft.com/office/drawing/2014/main" id="{86073400-4A6F-2AAB-6EF9-E8EEE71983BA}"/>
+              </a:ext>
+            </a:extLst>
+          </p:cNvPr>
+          <p:cNvPicPr>
+            <a:picLocks noChangeAspect="1"/>
+          </p:cNvPicPr>
+          <p:nvPr/>
+        </p:nvPicPr>
+        <p:blipFill>
+          <a:blip r:embed="rId2"/>
+          <a:stretch>
+            <a:fillRect/>
+          </a:stretch>
+        </p:blipFill>
+        <p:spPr>
+          <a:xfrm>
+            <a:off x="539552" y="1844824"/>
+            <a:ext cx="7391400" cy="790575"/>
+          </a:xfrm>
+          <a:prstGeom prst="rect">
+            <a:avLst/>
+          </a:prstGeom>
+        </p:spPr>
+      </p:pic>
+      <p:pic>
+        <p:nvPicPr>
+          <p:cNvPr id="8" name="그림 7">
+            <a:extLst>
+              <a:ext uri="{FF2B5EF4-FFF2-40B4-BE49-F238E27FC236}">
+                <a16:creationId xmlns:a16="http://schemas.microsoft.com/office/drawing/2014/main" id="{D7FCD62B-0935-F00F-2779-F1BE2CF84105}"/>
+              </a:ext>
+            </a:extLst>
+          </p:cNvPr>
+          <p:cNvPicPr>
+            <a:picLocks noChangeAspect="1"/>
+          </p:cNvPicPr>
+          <p:nvPr/>
+        </p:nvPicPr>
+        <p:blipFill>
+          <a:blip r:embed="rId3"/>
+          <a:stretch>
+            <a:fillRect/>
+          </a:stretch>
+        </p:blipFill>
+        <p:spPr>
+          <a:xfrm>
+            <a:off x="611560" y="2646432"/>
+            <a:ext cx="3409950" cy="3562350"/>
+          </a:xfrm>
+          <a:prstGeom prst="rect">
+            <a:avLst/>
+          </a:prstGeom>
+        </p:spPr>
+      </p:pic>
+    </p:spTree>
+    <p:extLst>
+      <p:ext uri="{BB962C8B-B14F-4D97-AF65-F5344CB8AC3E}">
+        <p14:creationId xmlns:p14="http://schemas.microsoft.com/office/powerpoint/2010/main" val="2148501479"/>
+      </p:ext>
+    </p:extLst>
+  </p:cSld>
+  <p:clrMapOvr>
+    <a:masterClrMapping/>
+  </p:clrMapOvr>
+</p:sld>
+</file>
+
+<file path=ppt/slides/slide11.xml><?xml version="1.0" encoding="utf-8"?>
+<p:sld xmlns:a="http://schemas.openxmlformats.org/drawingml/2006/main" xmlns:r="http://schemas.openxmlformats.org/officeDocument/2006/relationships" xmlns:p="http://schemas.openxmlformats.org/presentationml/2006/main">
+  <p:cSld>
+    <p:spTree>
+      <p:nvGrpSpPr>
+        <p:cNvPr id="1" name=""/>
+        <p:cNvGrpSpPr/>
+        <p:nvPr/>
+      </p:nvGrpSpPr>
+      <p:grpSpPr>
+        <a:xfrm>
+          <a:off x="0" y="0"/>
+          <a:ext cx="0" cy="0"/>
+          <a:chOff x="0" y="0"/>
+          <a:chExt cx="0" cy="0"/>
+        </a:xfrm>
+      </p:grpSpPr>
+      <p:sp>
+        <p:nvSpPr>
+          <p:cNvPr id="2" name="제목 1"/>
+          <p:cNvSpPr>
+            <a:spLocks noGrp="1"/>
+          </p:cNvSpPr>
+          <p:nvPr>
+            <p:ph type="title"/>
+          </p:nvPr>
+        </p:nvSpPr>
+        <p:spPr/>
+        <p:txBody>
+          <a:bodyPr/>
+          <a:lstStyle/>
+          <a:p>
+            <a:r>
+              <a:rPr lang="en-US" altLang="ko-KR" dirty="0"/>
+              <a:t>Ethernet Test Project</a:t>
+            </a:r>
+            <a:endParaRPr lang="ko-KR" altLang="en-US" dirty="0"/>
+          </a:p>
+        </p:txBody>
+      </p:sp>
+      <p:sp>
+        <p:nvSpPr>
+          <p:cNvPr id="3" name="슬라이드 번호 개체 틀 2"/>
+          <p:cNvSpPr>
+            <a:spLocks noGrp="1"/>
+          </p:cNvSpPr>
+          <p:nvPr>
+            <p:ph type="sldNum" sz="quarter" idx="4"/>
+          </p:nvPr>
+        </p:nvSpPr>
+        <p:spPr/>
+        <p:txBody>
+          <a:bodyPr/>
+          <a:lstStyle/>
+          <a:p>
+            <a:fld id="{77EEDA2F-F3C1-4EA9-BCEE-500E370C501D}" type="slidenum">
+              <a:rPr lang="ko-KR" altLang="en-US" smtClean="0"/>
+              <a:pPr/>
+              <a:t>11</a:t>
+            </a:fld>
+            <a:endParaRPr lang="ko-KR" altLang="en-US" dirty="0"/>
+          </a:p>
+        </p:txBody>
+      </p:sp>
+      <p:sp>
+        <p:nvSpPr>
+          <p:cNvPr id="5" name="내용 개체 틀 4">
+            <a:extLst>
+              <a:ext uri="{FF2B5EF4-FFF2-40B4-BE49-F238E27FC236}">
+                <a16:creationId xmlns:a16="http://schemas.microsoft.com/office/drawing/2014/main" id="{FBD6B0D5-C8B7-784E-B789-7299B2F86162}"/>
+              </a:ext>
+            </a:extLst>
+          </p:cNvPr>
+          <p:cNvSpPr>
+            <a:spLocks noGrp="1"/>
+          </p:cNvSpPr>
+          <p:nvPr>
+            <p:ph idx="1"/>
+          </p:nvPr>
+        </p:nvSpPr>
+        <p:spPr/>
+        <p:txBody>
+          <a:bodyPr>
+            <a:normAutofit/>
+          </a:bodyPr>
+          <a:lstStyle/>
+          <a:p>
+            <a:r>
+              <a:rPr lang="ko-KR" altLang="en-US" sz="2000" dirty="0"/>
+              <a:t>이미지 빌드 시 에러 발생</a:t>
+            </a:r>
+            <a:r>
+              <a:rPr lang="en-US" altLang="ko-KR" sz="2000" dirty="0"/>
+              <a:t>.</a:t>
+            </a:r>
+          </a:p>
+          <a:p>
+            <a:pPr marL="417513" lvl="2" indent="0">
+              <a:spcBef>
+                <a:spcPts val="0"/>
+              </a:spcBef>
+              <a:buNone/>
+            </a:pPr>
+            <a:br>
+              <a:rPr lang="en-US" altLang="ko-KR" sz="900" dirty="0">
+                <a:solidFill>
+                  <a:srgbClr val="000000"/>
+                </a:solidFill>
+                <a:effectLst/>
+                <a:latin typeface="Consolas" panose="020B0609020204030204" pitchFamily="49" charset="0"/>
+              </a:rPr>
+            </a:br>
+            <a:endParaRPr lang="en-US" altLang="ko-KR" sz="900" dirty="0">
+              <a:solidFill>
+                <a:srgbClr val="000000"/>
+              </a:solidFill>
+              <a:effectLst/>
+              <a:latin typeface="Consolas" panose="020B0609020204030204" pitchFamily="49" charset="0"/>
+            </a:endParaRPr>
+          </a:p>
+          <a:p>
+            <a:endParaRPr lang="en-US" altLang="ko-KR" sz="2000" dirty="0"/>
+          </a:p>
+          <a:p>
+            <a:endParaRPr lang="en-US" altLang="ko-KR" sz="2000" dirty="0"/>
+          </a:p>
+          <a:p>
+            <a:endParaRPr lang="en-US" altLang="ko-KR" sz="2000" dirty="0"/>
+          </a:p>
+          <a:p>
+            <a:r>
+              <a:rPr lang="en-US" altLang="ko-KR" sz="2000" dirty="0" err="1"/>
+              <a:t>fsdata.c</a:t>
+            </a:r>
+            <a:r>
+              <a:rPr lang="ko-KR" altLang="en-US" sz="2000" dirty="0"/>
+              <a:t>를 </a:t>
+            </a:r>
+            <a:r>
+              <a:rPr lang="en-US" altLang="ko-KR" sz="2000" dirty="0" err="1"/>
+              <a:t>Middlewares</a:t>
+            </a:r>
+            <a:r>
+              <a:rPr lang="en-US" altLang="ko-KR" sz="2000" dirty="0"/>
+              <a:t> -&gt; </a:t>
+            </a:r>
+            <a:r>
+              <a:rPr lang="en-US" altLang="ko-KR" sz="2000" dirty="0" err="1"/>
+              <a:t>Third_Party</a:t>
+            </a:r>
+            <a:r>
+              <a:rPr lang="en-US" altLang="ko-KR" sz="2000" dirty="0"/>
+              <a:t> -&gt; </a:t>
+            </a:r>
+            <a:r>
+              <a:rPr lang="en-US" altLang="ko-KR" sz="2000" dirty="0" err="1"/>
+              <a:t>LwIP</a:t>
+            </a:r>
+            <a:r>
+              <a:rPr lang="en-US" altLang="ko-KR" sz="2000" dirty="0"/>
+              <a:t> -&gt; </a:t>
+            </a:r>
+            <a:r>
+              <a:rPr lang="en-US" altLang="ko-KR" sz="2000" dirty="0" err="1"/>
+              <a:t>src</a:t>
+            </a:r>
+            <a:r>
+              <a:rPr lang="en-US" altLang="ko-KR" sz="2000" dirty="0"/>
+              <a:t> -&gt; apps -&gt; httpd </a:t>
+            </a:r>
+            <a:r>
+              <a:rPr lang="ko-KR" altLang="en-US" sz="2000" dirty="0"/>
+              <a:t>폴더에 복사</a:t>
+            </a:r>
+            <a:r>
+              <a:rPr lang="en-US" altLang="ko-KR" sz="2000" dirty="0"/>
+              <a:t>.</a:t>
+            </a:r>
+          </a:p>
+        </p:txBody>
+      </p:sp>
+      <p:pic>
+        <p:nvPicPr>
+          <p:cNvPr id="6" name="그림 5">
+            <a:extLst>
+              <a:ext uri="{FF2B5EF4-FFF2-40B4-BE49-F238E27FC236}">
+                <a16:creationId xmlns:a16="http://schemas.microsoft.com/office/drawing/2014/main" id="{372B225C-D429-1FCE-8B32-BEAC0DAAC941}"/>
+              </a:ext>
+            </a:extLst>
+          </p:cNvPr>
+          <p:cNvPicPr>
+            <a:picLocks noChangeAspect="1"/>
+          </p:cNvPicPr>
+          <p:nvPr/>
+        </p:nvPicPr>
+        <p:blipFill>
+          <a:blip r:embed="rId2"/>
+          <a:stretch>
+            <a:fillRect/>
+          </a:stretch>
+        </p:blipFill>
+        <p:spPr>
+          <a:xfrm>
+            <a:off x="568152" y="1700808"/>
+            <a:ext cx="8028384" cy="1041104"/>
+          </a:xfrm>
+          <a:prstGeom prst="rect">
+            <a:avLst/>
+          </a:prstGeom>
+        </p:spPr>
+      </p:pic>
+      <p:graphicFrame>
+        <p:nvGraphicFramePr>
+          <p:cNvPr id="11" name="개체 10">
+            <a:extLst>
+              <a:ext uri="{FF2B5EF4-FFF2-40B4-BE49-F238E27FC236}">
+                <a16:creationId xmlns:a16="http://schemas.microsoft.com/office/drawing/2014/main" id="{9C244748-1F6B-30E0-97F6-05C1725D983B}"/>
+              </a:ext>
+            </a:extLst>
+          </p:cNvPr>
+          <p:cNvGraphicFramePr>
+            <a:graphicFrameLocks noChangeAspect="1"/>
+          </p:cNvGraphicFramePr>
+          <p:nvPr>
+            <p:extLst>
+              <p:ext uri="{D42A27DB-BD31-4B8C-83A1-F6EECF244321}">
+                <p14:modId xmlns:p14="http://schemas.microsoft.com/office/powerpoint/2010/main" val="3014885191"/>
+              </p:ext>
+            </p:extLst>
+          </p:nvPr>
+        </p:nvGraphicFramePr>
+        <p:xfrm>
+          <a:off x="827584" y="3972407"/>
+          <a:ext cx="438150" cy="592138"/>
+        </p:xfrm>
+        <a:graphic>
+          <a:graphicData uri="http://schemas.openxmlformats.org/presentationml/2006/ole">
+            <mc:AlternateContent xmlns:mc="http://schemas.openxmlformats.org/markup-compatibility/2006">
+              <mc:Choice xmlns:v="urn:schemas-microsoft-com:vml" Requires="v">
+                <p:oleObj name="포장기 셸 개체" showAsIcon="1" r:id="rId3" imgW="438840" imgH="591480" progId="Package">
+                  <p:embed/>
+                </p:oleObj>
+              </mc:Choice>
+              <mc:Fallback>
+                <p:oleObj name="포장기 셸 개체" showAsIcon="1" r:id="rId3" imgW="438840" imgH="591480" progId="Package">
+                  <p:embed/>
+                  <p:pic>
+                    <p:nvPicPr>
+                      <p:cNvPr id="0" name=""/>
+                      <p:cNvPicPr/>
+                      <p:nvPr/>
+                    </p:nvPicPr>
+                    <p:blipFill>
+                      <a:blip r:embed="rId4"/>
+                      <a:stretch>
+                        <a:fillRect/>
+                      </a:stretch>
+                    </p:blipFill>
+                    <p:spPr>
+                      <a:xfrm>
+                        <a:off x="827584" y="3972407"/>
+                        <a:ext cx="438150" cy="592138"/>
+                      </a:xfrm>
+                      <a:prstGeom prst="rect">
+                        <a:avLst/>
+                      </a:prstGeom>
+                    </p:spPr>
+                  </p:pic>
+                </p:oleObj>
+              </mc:Fallback>
+            </mc:AlternateContent>
+          </a:graphicData>
+        </a:graphic>
+      </p:graphicFrame>
+    </p:spTree>
+    <p:extLst>
+      <p:ext uri="{BB962C8B-B14F-4D97-AF65-F5344CB8AC3E}">
+        <p14:creationId xmlns:p14="http://schemas.microsoft.com/office/powerpoint/2010/main" val="4017538619"/>
+      </p:ext>
+    </p:extLst>
+  </p:cSld>
+  <p:clrMapOvr>
+    <a:masterClrMapping/>
+  </p:clrMapOvr>
+</p:sld>
+</file>
+
+<file path=ppt/slides/slide12.xml><?xml version="1.0" encoding="utf-8"?>
+<p:sld xmlns:a="http://schemas.openxmlformats.org/drawingml/2006/main" xmlns:r="http://schemas.openxmlformats.org/officeDocument/2006/relationships" xmlns:p="http://schemas.openxmlformats.org/presentationml/2006/main">
+  <p:cSld>
+    <p:spTree>
+      <p:nvGrpSpPr>
+        <p:cNvPr id="1" name=""/>
+        <p:cNvGrpSpPr/>
+        <p:nvPr/>
+      </p:nvGrpSpPr>
+      <p:grpSpPr>
+        <a:xfrm>
+          <a:off x="0" y="0"/>
+          <a:ext cx="0" cy="0"/>
+          <a:chOff x="0" y="0"/>
+          <a:chExt cx="0" cy="0"/>
+        </a:xfrm>
+      </p:grpSpPr>
+      <p:sp>
+        <p:nvSpPr>
+          <p:cNvPr id="2" name="제목 1"/>
+          <p:cNvSpPr>
+            <a:spLocks noGrp="1"/>
+          </p:cNvSpPr>
+          <p:nvPr>
+            <p:ph type="title"/>
+          </p:nvPr>
+        </p:nvSpPr>
+        <p:spPr/>
+        <p:txBody>
+          <a:bodyPr/>
+          <a:lstStyle/>
+          <a:p>
+            <a:r>
+              <a:rPr lang="en-US" altLang="ko-KR" dirty="0"/>
+              <a:t>Ethernet Test Project</a:t>
+            </a:r>
+            <a:endParaRPr lang="ko-KR" altLang="en-US" dirty="0"/>
+          </a:p>
+        </p:txBody>
+      </p:sp>
+      <p:sp>
+        <p:nvSpPr>
+          <p:cNvPr id="3" name="슬라이드 번호 개체 틀 2"/>
+          <p:cNvSpPr>
+            <a:spLocks noGrp="1"/>
+          </p:cNvSpPr>
+          <p:nvPr>
+            <p:ph type="sldNum" sz="quarter" idx="4"/>
+          </p:nvPr>
+        </p:nvSpPr>
+        <p:spPr/>
+        <p:txBody>
+          <a:bodyPr/>
+          <a:lstStyle/>
+          <a:p>
+            <a:fld id="{77EEDA2F-F3C1-4EA9-BCEE-500E370C501D}" type="slidenum">
+              <a:rPr lang="ko-KR" altLang="en-US" smtClean="0"/>
+              <a:pPr/>
+              <a:t>12</a:t>
+            </a:fld>
+            <a:endParaRPr lang="ko-KR" altLang="en-US" dirty="0"/>
+          </a:p>
+        </p:txBody>
+      </p:sp>
+      <p:sp>
+        <p:nvSpPr>
+          <p:cNvPr id="5" name="내용 개체 틀 4">
+            <a:extLst>
+              <a:ext uri="{FF2B5EF4-FFF2-40B4-BE49-F238E27FC236}">
+                <a16:creationId xmlns:a16="http://schemas.microsoft.com/office/drawing/2014/main" id="{FBD6B0D5-C8B7-784E-B789-7299B2F86162}"/>
+              </a:ext>
+            </a:extLst>
+          </p:cNvPr>
+          <p:cNvSpPr>
+            <a:spLocks noGrp="1"/>
+          </p:cNvSpPr>
+          <p:nvPr>
+            <p:ph idx="1"/>
+          </p:nvPr>
+        </p:nvSpPr>
+        <p:spPr/>
+        <p:txBody>
+          <a:bodyPr>
+            <a:normAutofit/>
+          </a:bodyPr>
+          <a:lstStyle/>
+          <a:p>
+            <a:r>
               <a:rPr lang="en-US" altLang="ko-KR" sz="2000" dirty="0" err="1"/>
               <a:t>fsdata.c</a:t>
             </a:r>
@@ -3196,7 +3744,7 @@
 </p:sld>
 </file>
 
-<file path=ppt/slides/slide11.xml><?xml version="1.0" encoding="utf-8"?>
+<file path=ppt/slides/slide13.xml><?xml version="1.0" encoding="utf-8"?>
 <p:sld xmlns:a="http://schemas.openxmlformats.org/drawingml/2006/main" xmlns:r="http://schemas.openxmlformats.org/officeDocument/2006/relationships" xmlns:p="http://schemas.openxmlformats.org/presentationml/2006/main">
   <p:cSld>
     <p:spTree>
@@ -3257,7 +3805,7 @@
             <a:fld id="{77EEDA2F-F3C1-4EA9-BCEE-500E370C501D}" type="slidenum">
               <a:rPr lang="ko-KR" altLang="en-US" smtClean="0"/>
               <a:pPr/>
-              <a:t>11</a:t>
+              <a:t>13</a:t>
             </a:fld>
             <a:endParaRPr lang="ko-KR" altLang="en-US" dirty="0"/>
           </a:p>
@@ -3349,7 +3897,7 @@
 </p:sld>
 </file>
 
-<file path=ppt/slides/slide12.xml><?xml version="1.0" encoding="utf-8"?>
+<file path=ppt/slides/slide14.xml><?xml version="1.0" encoding="utf-8"?>
 <p:sld xmlns:a="http://schemas.openxmlformats.org/drawingml/2006/main" xmlns:r="http://schemas.openxmlformats.org/officeDocument/2006/relationships" xmlns:p="http://schemas.openxmlformats.org/presentationml/2006/main">
   <p:cSld>
     <p:spTree>
@@ -3410,7 +3958,7 @@
             <a:fld id="{77EEDA2F-F3C1-4EA9-BCEE-500E370C501D}" type="slidenum">
               <a:rPr lang="ko-KR" altLang="en-US" smtClean="0"/>
               <a:pPr/>
-              <a:t>12</a:t>
+              <a:t>14</a:t>
             </a:fld>
             <a:endParaRPr lang="ko-KR" altLang="en-US" dirty="0"/>
           </a:p>
@@ -3502,7 +4050,7 @@
 </p:sld>
 </file>
 
-<file path=ppt/slides/slide13.xml><?xml version="1.0" encoding="utf-8"?>
+<file path=ppt/slides/slide15.xml><?xml version="1.0" encoding="utf-8"?>
 <p:sld xmlns:a="http://schemas.openxmlformats.org/drawingml/2006/main" xmlns:r="http://schemas.openxmlformats.org/officeDocument/2006/relationships" xmlns:p="http://schemas.openxmlformats.org/presentationml/2006/main">
   <p:cSld>
     <p:spTree>
@@ -4820,6 +5368,434 @@
   <p:cSld>
     <p:spTree>
       <p:nvGrpSpPr>
+        <p:cNvPr id="1" name="">
+          <a:extLst>
+            <a:ext uri="{FF2B5EF4-FFF2-40B4-BE49-F238E27FC236}">
+              <a16:creationId xmlns:a16="http://schemas.microsoft.com/office/drawing/2014/main" id="{F1D81C4E-DABD-2F4E-7A6F-0BCFA46332B1}"/>
+            </a:ext>
+          </a:extLst>
+        </p:cNvPr>
+        <p:cNvGrpSpPr/>
+        <p:nvPr/>
+      </p:nvGrpSpPr>
+      <p:grpSpPr>
+        <a:xfrm>
+          <a:off x="0" y="0"/>
+          <a:ext cx="0" cy="0"/>
+          <a:chOff x="0" y="0"/>
+          <a:chExt cx="0" cy="0"/>
+        </a:xfrm>
+      </p:grpSpPr>
+      <p:sp>
+        <p:nvSpPr>
+          <p:cNvPr id="2" name="제목 1">
+            <a:extLst>
+              <a:ext uri="{FF2B5EF4-FFF2-40B4-BE49-F238E27FC236}">
+                <a16:creationId xmlns:a16="http://schemas.microsoft.com/office/drawing/2014/main" id="{27AFE262-19FB-3FE0-F274-B173B2507427}"/>
+              </a:ext>
+            </a:extLst>
+          </p:cNvPr>
+          <p:cNvSpPr>
+            <a:spLocks noGrp="1"/>
+          </p:cNvSpPr>
+          <p:nvPr>
+            <p:ph type="title"/>
+          </p:nvPr>
+        </p:nvSpPr>
+        <p:spPr/>
+        <p:txBody>
+          <a:bodyPr/>
+          <a:lstStyle/>
+          <a:p>
+            <a:r>
+              <a:rPr lang="en-US" altLang="ko-KR" dirty="0"/>
+              <a:t>ETH </a:t>
+            </a:r>
+            <a:r>
+              <a:rPr lang="ko-KR" altLang="en-US" dirty="0"/>
+              <a:t>설정</a:t>
+            </a:r>
+            <a:r>
+              <a:rPr lang="en-US" altLang="ko-KR" dirty="0"/>
+              <a:t>(2)</a:t>
+            </a:r>
+            <a:endParaRPr lang="ko-KR" altLang="en-US" dirty="0"/>
+          </a:p>
+        </p:txBody>
+      </p:sp>
+      <p:sp>
+        <p:nvSpPr>
+          <p:cNvPr id="3" name="슬라이드 번호 개체 틀 2">
+            <a:extLst>
+              <a:ext uri="{FF2B5EF4-FFF2-40B4-BE49-F238E27FC236}">
+                <a16:creationId xmlns:a16="http://schemas.microsoft.com/office/drawing/2014/main" id="{FE9CE2C0-E536-31E6-1382-3F7D2FCCAD42}"/>
+              </a:ext>
+            </a:extLst>
+          </p:cNvPr>
+          <p:cNvSpPr>
+            <a:spLocks noGrp="1"/>
+          </p:cNvSpPr>
+          <p:nvPr>
+            <p:ph type="sldNum" sz="quarter" idx="4"/>
+          </p:nvPr>
+        </p:nvSpPr>
+        <p:spPr/>
+        <p:txBody>
+          <a:bodyPr/>
+          <a:lstStyle/>
+          <a:p>
+            <a:fld id="{77EEDA2F-F3C1-4EA9-BCEE-500E370C501D}" type="slidenum">
+              <a:rPr lang="ko-KR" altLang="en-US" smtClean="0"/>
+              <a:pPr/>
+              <a:t>6</a:t>
+            </a:fld>
+            <a:endParaRPr lang="ko-KR" altLang="en-US" dirty="0"/>
+          </a:p>
+        </p:txBody>
+      </p:sp>
+      <p:sp>
+        <p:nvSpPr>
+          <p:cNvPr id="5" name="내용 개체 틀 4">
+            <a:extLst>
+              <a:ext uri="{FF2B5EF4-FFF2-40B4-BE49-F238E27FC236}">
+                <a16:creationId xmlns:a16="http://schemas.microsoft.com/office/drawing/2014/main" id="{EA6F3B15-6A47-D815-7130-57D204F26EC6}"/>
+              </a:ext>
+            </a:extLst>
+          </p:cNvPr>
+          <p:cNvSpPr>
+            <a:spLocks noGrp="1"/>
+          </p:cNvSpPr>
+          <p:nvPr>
+            <p:ph idx="1"/>
+          </p:nvPr>
+        </p:nvSpPr>
+        <p:spPr>
+          <a:xfrm>
+            <a:off x="457200" y="1239195"/>
+            <a:ext cx="8229600" cy="4525963"/>
+          </a:xfrm>
+        </p:spPr>
+        <p:txBody>
+          <a:bodyPr>
+            <a:normAutofit/>
+          </a:bodyPr>
+          <a:lstStyle/>
+          <a:p>
+            <a:r>
+              <a:rPr lang="en-US" altLang="ko-KR" sz="1400" dirty="0"/>
+              <a:t>“Configuration” -&gt; “Advanced Parameters” </a:t>
+            </a:r>
+            <a:r>
+              <a:rPr lang="ko-KR" altLang="en-US" sz="1400" dirty="0"/>
+              <a:t>클릭</a:t>
+            </a:r>
+            <a:r>
+              <a:rPr lang="en-US" altLang="ko-KR" sz="1400" dirty="0"/>
+              <a:t>.</a:t>
+            </a:r>
+          </a:p>
+          <a:p>
+            <a:r>
+              <a:rPr lang="en-US" altLang="ko-KR" sz="1400" dirty="0"/>
+              <a:t>Mango-M32F2_V1.2, RTL8201F</a:t>
+            </a:r>
+            <a:r>
+              <a:rPr lang="ko-KR" altLang="en-US" sz="1400" dirty="0"/>
+              <a:t> 이더넷 </a:t>
+            </a:r>
+            <a:r>
+              <a:rPr lang="en-US" altLang="ko-KR" sz="1400" dirty="0"/>
+              <a:t>PHY</a:t>
+            </a:r>
+            <a:r>
+              <a:rPr lang="ko-KR" altLang="en-US" sz="1400" dirty="0"/>
+              <a:t>인 경우 </a:t>
+            </a:r>
+            <a:r>
+              <a:rPr lang="en-US" altLang="ko-KR" sz="1400" dirty="0"/>
+              <a:t>PHY ADDRESS</a:t>
+            </a:r>
+            <a:r>
+              <a:rPr lang="ko-KR" altLang="en-US" sz="1400" dirty="0"/>
+              <a:t>를 </a:t>
+            </a:r>
+            <a:r>
+              <a:rPr lang="en-US" altLang="ko-KR" sz="1400" dirty="0"/>
+              <a:t>1</a:t>
+            </a:r>
+            <a:r>
+              <a:rPr lang="ko-KR" altLang="en-US" sz="1400" dirty="0"/>
+              <a:t>로 선택</a:t>
+            </a:r>
+            <a:r>
+              <a:rPr lang="en-US" altLang="ko-KR" sz="1400" dirty="0"/>
+              <a:t>.</a:t>
+            </a:r>
+          </a:p>
+        </p:txBody>
+      </p:sp>
+      <p:pic>
+        <p:nvPicPr>
+          <p:cNvPr id="7" name="그림 6">
+            <a:extLst>
+              <a:ext uri="{FF2B5EF4-FFF2-40B4-BE49-F238E27FC236}">
+                <a16:creationId xmlns:a16="http://schemas.microsoft.com/office/drawing/2014/main" id="{32F27B14-093C-1E10-1BB3-3695E0799720}"/>
+              </a:ext>
+            </a:extLst>
+          </p:cNvPr>
+          <p:cNvPicPr>
+            <a:picLocks noChangeAspect="1"/>
+          </p:cNvPicPr>
+          <p:nvPr/>
+        </p:nvPicPr>
+        <p:blipFill>
+          <a:blip r:embed="rId2"/>
+          <a:stretch>
+            <a:fillRect/>
+          </a:stretch>
+        </p:blipFill>
+        <p:spPr>
+          <a:xfrm>
+            <a:off x="2219722" y="1854842"/>
+            <a:ext cx="4296494" cy="4654535"/>
+          </a:xfrm>
+          <a:prstGeom prst="rect">
+            <a:avLst/>
+          </a:prstGeom>
+        </p:spPr>
+      </p:pic>
+    </p:spTree>
+    <p:extLst>
+      <p:ext uri="{BB962C8B-B14F-4D97-AF65-F5344CB8AC3E}">
+        <p14:creationId xmlns:p14="http://schemas.microsoft.com/office/powerpoint/2010/main" val="3290618276"/>
+      </p:ext>
+    </p:extLst>
+  </p:cSld>
+  <p:clrMapOvr>
+    <a:masterClrMapping/>
+  </p:clrMapOvr>
+</p:sld>
+</file>
+
+<file path=ppt/slides/slide7.xml><?xml version="1.0" encoding="utf-8"?>
+<p:sld xmlns:a="http://schemas.openxmlformats.org/drawingml/2006/main" xmlns:r="http://schemas.openxmlformats.org/officeDocument/2006/relationships" xmlns:p="http://schemas.openxmlformats.org/presentationml/2006/main">
+  <p:cSld>
+    <p:spTree>
+      <p:nvGrpSpPr>
+        <p:cNvPr id="1" name="">
+          <a:extLst>
+            <a:ext uri="{FF2B5EF4-FFF2-40B4-BE49-F238E27FC236}">
+              <a16:creationId xmlns:a16="http://schemas.microsoft.com/office/drawing/2014/main" id="{460FACE2-F645-6BBF-4F58-F15C20D11079}"/>
+            </a:ext>
+          </a:extLst>
+        </p:cNvPr>
+        <p:cNvGrpSpPr/>
+        <p:nvPr/>
+      </p:nvGrpSpPr>
+      <p:grpSpPr>
+        <a:xfrm>
+          <a:off x="0" y="0"/>
+          <a:ext cx="0" cy="0"/>
+          <a:chOff x="0" y="0"/>
+          <a:chExt cx="0" cy="0"/>
+        </a:xfrm>
+      </p:grpSpPr>
+      <p:sp>
+        <p:nvSpPr>
+          <p:cNvPr id="2" name="제목 1">
+            <a:extLst>
+              <a:ext uri="{FF2B5EF4-FFF2-40B4-BE49-F238E27FC236}">
+                <a16:creationId xmlns:a16="http://schemas.microsoft.com/office/drawing/2014/main" id="{078444AE-D33B-BAA0-51EA-0EAA8A22D640}"/>
+              </a:ext>
+            </a:extLst>
+          </p:cNvPr>
+          <p:cNvSpPr>
+            <a:spLocks noGrp="1"/>
+          </p:cNvSpPr>
+          <p:nvPr>
+            <p:ph type="title"/>
+          </p:nvPr>
+        </p:nvSpPr>
+        <p:spPr/>
+        <p:txBody>
+          <a:bodyPr/>
+          <a:lstStyle/>
+          <a:p>
+            <a:r>
+              <a:rPr lang="en-US" altLang="ko-KR" dirty="0"/>
+              <a:t>ETH </a:t>
+            </a:r>
+            <a:r>
+              <a:rPr lang="ko-KR" altLang="en-US" dirty="0"/>
+              <a:t>설정</a:t>
+            </a:r>
+            <a:r>
+              <a:rPr lang="en-US" altLang="ko-KR" dirty="0"/>
+              <a:t>(3)</a:t>
+            </a:r>
+            <a:endParaRPr lang="ko-KR" altLang="en-US" dirty="0"/>
+          </a:p>
+        </p:txBody>
+      </p:sp>
+      <p:sp>
+        <p:nvSpPr>
+          <p:cNvPr id="3" name="슬라이드 번호 개체 틀 2">
+            <a:extLst>
+              <a:ext uri="{FF2B5EF4-FFF2-40B4-BE49-F238E27FC236}">
+                <a16:creationId xmlns:a16="http://schemas.microsoft.com/office/drawing/2014/main" id="{A1280FC0-37FC-819A-D85D-608AF96CD850}"/>
+              </a:ext>
+            </a:extLst>
+          </p:cNvPr>
+          <p:cNvSpPr>
+            <a:spLocks noGrp="1"/>
+          </p:cNvSpPr>
+          <p:nvPr>
+            <p:ph type="sldNum" sz="quarter" idx="4"/>
+          </p:nvPr>
+        </p:nvSpPr>
+        <p:spPr/>
+        <p:txBody>
+          <a:bodyPr/>
+          <a:lstStyle/>
+          <a:p>
+            <a:fld id="{77EEDA2F-F3C1-4EA9-BCEE-500E370C501D}" type="slidenum">
+              <a:rPr lang="ko-KR" altLang="en-US" smtClean="0"/>
+              <a:pPr/>
+              <a:t>7</a:t>
+            </a:fld>
+            <a:endParaRPr lang="ko-KR" altLang="en-US" dirty="0"/>
+          </a:p>
+        </p:txBody>
+      </p:sp>
+      <p:sp>
+        <p:nvSpPr>
+          <p:cNvPr id="5" name="내용 개체 틀 4">
+            <a:extLst>
+              <a:ext uri="{FF2B5EF4-FFF2-40B4-BE49-F238E27FC236}">
+                <a16:creationId xmlns:a16="http://schemas.microsoft.com/office/drawing/2014/main" id="{9A332541-2ABD-E5C6-2176-3BA8C5E4DE66}"/>
+              </a:ext>
+            </a:extLst>
+          </p:cNvPr>
+          <p:cNvSpPr>
+            <a:spLocks noGrp="1"/>
+          </p:cNvSpPr>
+          <p:nvPr>
+            <p:ph idx="1"/>
+          </p:nvPr>
+        </p:nvSpPr>
+        <p:spPr>
+          <a:xfrm>
+            <a:off x="457200" y="1239195"/>
+            <a:ext cx="8229600" cy="4525963"/>
+          </a:xfrm>
+        </p:spPr>
+        <p:txBody>
+          <a:bodyPr>
+            <a:normAutofit/>
+          </a:bodyPr>
+          <a:lstStyle/>
+          <a:p>
+            <a:r>
+              <a:rPr lang="en-US" altLang="ko-KR" sz="1400" dirty="0"/>
+              <a:t>“Configuration” -&gt; “Parameter Settings” </a:t>
+            </a:r>
+            <a:r>
+              <a:rPr lang="ko-KR" altLang="en-US" sz="1400" dirty="0"/>
+              <a:t>클릭</a:t>
+            </a:r>
+            <a:r>
+              <a:rPr lang="en-US" altLang="ko-KR" sz="1400" dirty="0"/>
+              <a:t>.</a:t>
+            </a:r>
+          </a:p>
+          <a:p>
+            <a:r>
+              <a:rPr lang="en-US" altLang="ko-KR" sz="1400" dirty="0"/>
+              <a:t>Mango-M32F2_V2.0, KSZ8081MNX</a:t>
+            </a:r>
+            <a:r>
+              <a:rPr lang="ko-KR" altLang="en-US" sz="1400" dirty="0"/>
+              <a:t> 이더넷 </a:t>
+            </a:r>
+            <a:r>
+              <a:rPr lang="en-US" altLang="ko-KR" sz="1400" dirty="0"/>
+              <a:t>PHY</a:t>
+            </a:r>
+            <a:r>
+              <a:rPr lang="ko-KR" altLang="en-US" sz="1400" dirty="0"/>
+              <a:t>인 경우 </a:t>
+            </a:r>
+            <a:r>
+              <a:rPr lang="en-US" altLang="ko-KR" sz="1400" dirty="0"/>
+              <a:t>PHY ADDRESS</a:t>
+            </a:r>
+            <a:r>
+              <a:rPr lang="ko-KR" altLang="en-US" sz="1400" dirty="0"/>
+              <a:t>를 </a:t>
+            </a:r>
+            <a:r>
+              <a:rPr lang="en-US" altLang="ko-KR" sz="1400" dirty="0"/>
+              <a:t>3</a:t>
+            </a:r>
+            <a:r>
+              <a:rPr lang="ko-KR" altLang="en-US" sz="1400" dirty="0"/>
+              <a:t>으로 선택</a:t>
+            </a:r>
+            <a:r>
+              <a:rPr lang="en-US" altLang="ko-KR" sz="1400" dirty="0"/>
+              <a:t>.</a:t>
+            </a:r>
+          </a:p>
+        </p:txBody>
+      </p:sp>
+      <p:pic>
+        <p:nvPicPr>
+          <p:cNvPr id="6" name="그림 5">
+            <a:extLst>
+              <a:ext uri="{FF2B5EF4-FFF2-40B4-BE49-F238E27FC236}">
+                <a16:creationId xmlns:a16="http://schemas.microsoft.com/office/drawing/2014/main" id="{A9419A7E-BB68-5DD8-ACB2-96760182B18C}"/>
+              </a:ext>
+            </a:extLst>
+          </p:cNvPr>
+          <p:cNvPicPr>
+            <a:picLocks noChangeAspect="1"/>
+          </p:cNvPicPr>
+          <p:nvPr/>
+        </p:nvPicPr>
+        <p:blipFill>
+          <a:blip r:embed="rId2"/>
+          <a:stretch>
+            <a:fillRect/>
+          </a:stretch>
+        </p:blipFill>
+        <p:spPr>
+          <a:xfrm>
+            <a:off x="2157412" y="1954023"/>
+            <a:ext cx="4829175" cy="4438650"/>
+          </a:xfrm>
+          <a:prstGeom prst="rect">
+            <a:avLst/>
+          </a:prstGeom>
+        </p:spPr>
+      </p:pic>
+    </p:spTree>
+    <p:extLst>
+      <p:ext uri="{BB962C8B-B14F-4D97-AF65-F5344CB8AC3E}">
+        <p14:creationId xmlns:p14="http://schemas.microsoft.com/office/powerpoint/2010/main" val="1945103945"/>
+      </p:ext>
+    </p:extLst>
+  </p:cSld>
+  <p:clrMapOvr>
+    <a:masterClrMapping/>
+  </p:clrMapOvr>
+</p:sld>
+</file>
+
+<file path=ppt/slides/slide8.xml><?xml version="1.0" encoding="utf-8"?>
+<p:sld xmlns:a="http://schemas.openxmlformats.org/drawingml/2006/main" xmlns:r="http://schemas.openxmlformats.org/officeDocument/2006/relationships" xmlns:p="http://schemas.openxmlformats.org/presentationml/2006/main">
+  <p:cSld>
+    <p:spTree>
+      <p:nvGrpSpPr>
         <p:cNvPr id="1" name=""/>
         <p:cNvGrpSpPr/>
         <p:nvPr/>
@@ -4876,7 +5852,7 @@
             <a:fld id="{77EEDA2F-F3C1-4EA9-BCEE-500E370C501D}" type="slidenum">
               <a:rPr lang="ko-KR" altLang="en-US" smtClean="0"/>
               <a:pPr/>
-              <a:t>6</a:t>
+              <a:t>8</a:t>
             </a:fld>
             <a:endParaRPr lang="ko-KR" altLang="en-US" dirty="0"/>
           </a:p>
@@ -5018,7 +5994,7 @@
 </p:sld>
 </file>
 
-<file path=ppt/slides/slide7.xml><?xml version="1.0" encoding="utf-8"?>
+<file path=ppt/slides/slide9.xml><?xml version="1.0" encoding="utf-8"?>
 <p:sld xmlns:a="http://schemas.openxmlformats.org/drawingml/2006/main" xmlns:r="http://schemas.openxmlformats.org/officeDocument/2006/relationships" xmlns:p="http://schemas.openxmlformats.org/presentationml/2006/main">
   <p:cSld>
     <p:spTree>
@@ -5079,7 +6055,7 @@
             <a:fld id="{77EEDA2F-F3C1-4EA9-BCEE-500E370C501D}" type="slidenum">
               <a:rPr lang="ko-KR" altLang="en-US" smtClean="0"/>
               <a:pPr/>
-              <a:t>7</a:t>
+              <a:t>9</a:t>
             </a:fld>
             <a:endParaRPr lang="ko-KR" altLang="en-US" dirty="0"/>
           </a:p>
@@ -5196,552 +6172,6 @@
     <p:extLst>
       <p:ext uri="{BB962C8B-B14F-4D97-AF65-F5344CB8AC3E}">
         <p14:creationId xmlns:p14="http://schemas.microsoft.com/office/powerpoint/2010/main" val="1051628387"/>
-      </p:ext>
-    </p:extLst>
-  </p:cSld>
-  <p:clrMapOvr>
-    <a:masterClrMapping/>
-  </p:clrMapOvr>
-</p:sld>
-</file>
-
-<file path=ppt/slides/slide8.xml><?xml version="1.0" encoding="utf-8"?>
-<p:sld xmlns:a="http://schemas.openxmlformats.org/drawingml/2006/main" xmlns:r="http://schemas.openxmlformats.org/officeDocument/2006/relationships" xmlns:p="http://schemas.openxmlformats.org/presentationml/2006/main">
-  <p:cSld>
-    <p:spTree>
-      <p:nvGrpSpPr>
-        <p:cNvPr id="1" name=""/>
-        <p:cNvGrpSpPr/>
-        <p:nvPr/>
-      </p:nvGrpSpPr>
-      <p:grpSpPr>
-        <a:xfrm>
-          <a:off x="0" y="0"/>
-          <a:ext cx="0" cy="0"/>
-          <a:chOff x="0" y="0"/>
-          <a:chExt cx="0" cy="0"/>
-        </a:xfrm>
-      </p:grpSpPr>
-      <p:sp>
-        <p:nvSpPr>
-          <p:cNvPr id="2" name="제목 1"/>
-          <p:cNvSpPr>
-            <a:spLocks noGrp="1"/>
-          </p:cNvSpPr>
-          <p:nvPr>
-            <p:ph type="title"/>
-          </p:nvPr>
-        </p:nvSpPr>
-        <p:spPr/>
-        <p:txBody>
-          <a:bodyPr/>
-          <a:lstStyle/>
-          <a:p>
-            <a:r>
-              <a:rPr lang="en-US" altLang="ko-KR" dirty="0"/>
-              <a:t>Ethernet Test Project</a:t>
-            </a:r>
-            <a:endParaRPr lang="ko-KR" altLang="en-US" dirty="0"/>
-          </a:p>
-        </p:txBody>
-      </p:sp>
-      <p:sp>
-        <p:nvSpPr>
-          <p:cNvPr id="3" name="슬라이드 번호 개체 틀 2"/>
-          <p:cNvSpPr>
-            <a:spLocks noGrp="1"/>
-          </p:cNvSpPr>
-          <p:nvPr>
-            <p:ph type="sldNum" sz="quarter" idx="4"/>
-          </p:nvPr>
-        </p:nvSpPr>
-        <p:spPr/>
-        <p:txBody>
-          <a:bodyPr/>
-          <a:lstStyle/>
-          <a:p>
-            <a:fld id="{77EEDA2F-F3C1-4EA9-BCEE-500E370C501D}" type="slidenum">
-              <a:rPr lang="ko-KR" altLang="en-US" smtClean="0"/>
-              <a:pPr/>
-              <a:t>8</a:t>
-            </a:fld>
-            <a:endParaRPr lang="ko-KR" altLang="en-US" dirty="0"/>
-          </a:p>
-        </p:txBody>
-      </p:sp>
-      <p:sp>
-        <p:nvSpPr>
-          <p:cNvPr id="5" name="내용 개체 틀 4">
-            <a:extLst>
-              <a:ext uri="{FF2B5EF4-FFF2-40B4-BE49-F238E27FC236}">
-                <a16:creationId xmlns:a16="http://schemas.microsoft.com/office/drawing/2014/main" id="{FBD6B0D5-C8B7-784E-B789-7299B2F86162}"/>
-              </a:ext>
-            </a:extLst>
-          </p:cNvPr>
-          <p:cNvSpPr>
-            <a:spLocks noGrp="1"/>
-          </p:cNvSpPr>
-          <p:nvPr>
-            <p:ph idx="1"/>
-          </p:nvPr>
-        </p:nvSpPr>
-        <p:spPr/>
-        <p:txBody>
-          <a:bodyPr>
-            <a:normAutofit/>
-          </a:bodyPr>
-          <a:lstStyle/>
-          <a:p>
-            <a:r>
-              <a:rPr lang="en-US" altLang="ko-KR" sz="1400" dirty="0"/>
-              <a:t>Code </a:t>
-            </a:r>
-            <a:r>
-              <a:rPr lang="ko-KR" altLang="en-US" sz="1400" dirty="0"/>
-              <a:t>생성 후 </a:t>
-            </a:r>
-            <a:r>
-              <a:rPr lang="en-US" altLang="ko-KR" sz="1400" dirty="0" err="1"/>
-              <a:t>main.c</a:t>
-            </a:r>
-            <a:r>
-              <a:rPr lang="en-US" altLang="ko-KR" sz="1400" dirty="0"/>
-              <a:t> </a:t>
-            </a:r>
-            <a:r>
-              <a:rPr lang="ko-KR" altLang="en-US" sz="1400" dirty="0"/>
-              <a:t>수정 </a:t>
-            </a:r>
-            <a:r>
-              <a:rPr lang="en-US" altLang="ko-KR" sz="1400" dirty="0"/>
-              <a:t>- header</a:t>
-            </a:r>
-            <a:r>
-              <a:rPr lang="ko-KR" altLang="en-US" sz="1400" dirty="0"/>
-              <a:t>추가</a:t>
-            </a:r>
-            <a:r>
-              <a:rPr lang="en-US" altLang="ko-KR" sz="1400" dirty="0"/>
-              <a:t>.</a:t>
-            </a:r>
-          </a:p>
-          <a:p>
-            <a:r>
-              <a:rPr lang="en-US" altLang="ko-KR" sz="1400" dirty="0" err="1"/>
-              <a:t>httpd_init</a:t>
-            </a:r>
-            <a:r>
-              <a:rPr lang="en-US" altLang="ko-KR" sz="1400" dirty="0"/>
-              <a:t>() / </a:t>
-            </a:r>
-            <a:r>
-              <a:rPr lang="en-US" altLang="ko-KR" sz="1400" dirty="0" err="1"/>
-              <a:t>MX_LWIP_Process</a:t>
-            </a:r>
-            <a:r>
-              <a:rPr lang="en-US" altLang="ko-KR" sz="1400" dirty="0"/>
-              <a:t>()</a:t>
-            </a:r>
-            <a:r>
-              <a:rPr lang="ko-KR" altLang="en-US" sz="1400" dirty="0"/>
-              <a:t>호출 추가</a:t>
-            </a:r>
-            <a:endParaRPr lang="en-US" altLang="ko-KR" sz="1400" dirty="0"/>
-          </a:p>
-          <a:p>
-            <a:pPr marL="417513" lvl="2" indent="0">
-              <a:spcBef>
-                <a:spcPts val="0"/>
-              </a:spcBef>
-              <a:buNone/>
-            </a:pPr>
-            <a:endParaRPr lang="en-US" altLang="ko-KR" sz="900" dirty="0">
-              <a:solidFill>
-                <a:srgbClr val="000000"/>
-              </a:solidFill>
-              <a:latin typeface="Consolas" panose="020B0609020204030204" pitchFamily="49" charset="0"/>
-            </a:endParaRPr>
-          </a:p>
-          <a:p>
-            <a:pPr marL="417513" lvl="2" indent="0">
-              <a:spcBef>
-                <a:spcPts val="0"/>
-              </a:spcBef>
-              <a:buNone/>
-            </a:pPr>
-            <a:br>
-              <a:rPr lang="en-US" altLang="ko-KR" sz="900" dirty="0">
-                <a:solidFill>
-                  <a:srgbClr val="000000"/>
-                </a:solidFill>
-                <a:effectLst/>
-                <a:latin typeface="Consolas" panose="020B0609020204030204" pitchFamily="49" charset="0"/>
-              </a:rPr>
-            </a:br>
-            <a:endParaRPr lang="en-US" altLang="ko-KR" sz="900" dirty="0">
-              <a:solidFill>
-                <a:srgbClr val="000000"/>
-              </a:solidFill>
-              <a:effectLst/>
-              <a:latin typeface="Consolas" panose="020B0609020204030204" pitchFamily="49" charset="0"/>
-            </a:endParaRPr>
-          </a:p>
-          <a:p>
-            <a:endParaRPr lang="en-US" altLang="ko-KR" sz="2000" dirty="0"/>
-          </a:p>
-        </p:txBody>
-      </p:sp>
-      <p:pic>
-        <p:nvPicPr>
-          <p:cNvPr id="6" name="그림 5">
-            <a:extLst>
-              <a:ext uri="{FF2B5EF4-FFF2-40B4-BE49-F238E27FC236}">
-                <a16:creationId xmlns:a16="http://schemas.microsoft.com/office/drawing/2014/main" id="{86073400-4A6F-2AAB-6EF9-E8EEE71983BA}"/>
-              </a:ext>
-            </a:extLst>
-          </p:cNvPr>
-          <p:cNvPicPr>
-            <a:picLocks noChangeAspect="1"/>
-          </p:cNvPicPr>
-          <p:nvPr/>
-        </p:nvPicPr>
-        <p:blipFill>
-          <a:blip r:embed="rId2"/>
-          <a:stretch>
-            <a:fillRect/>
-          </a:stretch>
-        </p:blipFill>
-        <p:spPr>
-          <a:xfrm>
-            <a:off x="539552" y="1844824"/>
-            <a:ext cx="7391400" cy="790575"/>
-          </a:xfrm>
-          <a:prstGeom prst="rect">
-            <a:avLst/>
-          </a:prstGeom>
-        </p:spPr>
-      </p:pic>
-      <p:pic>
-        <p:nvPicPr>
-          <p:cNvPr id="8" name="그림 7">
-            <a:extLst>
-              <a:ext uri="{FF2B5EF4-FFF2-40B4-BE49-F238E27FC236}">
-                <a16:creationId xmlns:a16="http://schemas.microsoft.com/office/drawing/2014/main" id="{D7FCD62B-0935-F00F-2779-F1BE2CF84105}"/>
-              </a:ext>
-            </a:extLst>
-          </p:cNvPr>
-          <p:cNvPicPr>
-            <a:picLocks noChangeAspect="1"/>
-          </p:cNvPicPr>
-          <p:nvPr/>
-        </p:nvPicPr>
-        <p:blipFill>
-          <a:blip r:embed="rId3"/>
-          <a:stretch>
-            <a:fillRect/>
-          </a:stretch>
-        </p:blipFill>
-        <p:spPr>
-          <a:xfrm>
-            <a:off x="611560" y="2646432"/>
-            <a:ext cx="3409950" cy="3562350"/>
-          </a:xfrm>
-          <a:prstGeom prst="rect">
-            <a:avLst/>
-          </a:prstGeom>
-        </p:spPr>
-      </p:pic>
-    </p:spTree>
-    <p:extLst>
-      <p:ext uri="{BB962C8B-B14F-4D97-AF65-F5344CB8AC3E}">
-        <p14:creationId xmlns:p14="http://schemas.microsoft.com/office/powerpoint/2010/main" val="2148501479"/>
-      </p:ext>
-    </p:extLst>
-  </p:cSld>
-  <p:clrMapOvr>
-    <a:masterClrMapping/>
-  </p:clrMapOvr>
-</p:sld>
-</file>
-
-<file path=ppt/slides/slide9.xml><?xml version="1.0" encoding="utf-8"?>
-<p:sld xmlns:a="http://schemas.openxmlformats.org/drawingml/2006/main" xmlns:r="http://schemas.openxmlformats.org/officeDocument/2006/relationships" xmlns:p="http://schemas.openxmlformats.org/presentationml/2006/main">
-  <p:cSld>
-    <p:spTree>
-      <p:nvGrpSpPr>
-        <p:cNvPr id="1" name=""/>
-        <p:cNvGrpSpPr/>
-        <p:nvPr/>
-      </p:nvGrpSpPr>
-      <p:grpSpPr>
-        <a:xfrm>
-          <a:off x="0" y="0"/>
-          <a:ext cx="0" cy="0"/>
-          <a:chOff x="0" y="0"/>
-          <a:chExt cx="0" cy="0"/>
-        </a:xfrm>
-      </p:grpSpPr>
-      <p:sp>
-        <p:nvSpPr>
-          <p:cNvPr id="2" name="제목 1"/>
-          <p:cNvSpPr>
-            <a:spLocks noGrp="1"/>
-          </p:cNvSpPr>
-          <p:nvPr>
-            <p:ph type="title"/>
-          </p:nvPr>
-        </p:nvSpPr>
-        <p:spPr/>
-        <p:txBody>
-          <a:bodyPr/>
-          <a:lstStyle/>
-          <a:p>
-            <a:r>
-              <a:rPr lang="en-US" altLang="ko-KR" dirty="0"/>
-              <a:t>Ethernet Test Project</a:t>
-            </a:r>
-            <a:endParaRPr lang="ko-KR" altLang="en-US" dirty="0"/>
-          </a:p>
-        </p:txBody>
-      </p:sp>
-      <p:sp>
-        <p:nvSpPr>
-          <p:cNvPr id="3" name="슬라이드 번호 개체 틀 2"/>
-          <p:cNvSpPr>
-            <a:spLocks noGrp="1"/>
-          </p:cNvSpPr>
-          <p:nvPr>
-            <p:ph type="sldNum" sz="quarter" idx="4"/>
-          </p:nvPr>
-        </p:nvSpPr>
-        <p:spPr/>
-        <p:txBody>
-          <a:bodyPr/>
-          <a:lstStyle/>
-          <a:p>
-            <a:fld id="{77EEDA2F-F3C1-4EA9-BCEE-500E370C501D}" type="slidenum">
-              <a:rPr lang="ko-KR" altLang="en-US" smtClean="0"/>
-              <a:pPr/>
-              <a:t>9</a:t>
-            </a:fld>
-            <a:endParaRPr lang="ko-KR" altLang="en-US" dirty="0"/>
-          </a:p>
-        </p:txBody>
-      </p:sp>
-      <p:sp>
-        <p:nvSpPr>
-          <p:cNvPr id="5" name="내용 개체 틀 4">
-            <a:extLst>
-              <a:ext uri="{FF2B5EF4-FFF2-40B4-BE49-F238E27FC236}">
-                <a16:creationId xmlns:a16="http://schemas.microsoft.com/office/drawing/2014/main" id="{FBD6B0D5-C8B7-784E-B789-7299B2F86162}"/>
-              </a:ext>
-            </a:extLst>
-          </p:cNvPr>
-          <p:cNvSpPr>
-            <a:spLocks noGrp="1"/>
-          </p:cNvSpPr>
-          <p:nvPr>
-            <p:ph idx="1"/>
-          </p:nvPr>
-        </p:nvSpPr>
-        <p:spPr/>
-        <p:txBody>
-          <a:bodyPr>
-            <a:normAutofit/>
-          </a:bodyPr>
-          <a:lstStyle/>
-          <a:p>
-            <a:r>
-              <a:rPr lang="ko-KR" altLang="en-US" sz="2000" dirty="0"/>
-              <a:t>이미지 빌드 시 에러 발생</a:t>
-            </a:r>
-            <a:r>
-              <a:rPr lang="en-US" altLang="ko-KR" sz="2000" dirty="0"/>
-              <a:t>.</a:t>
-            </a:r>
-          </a:p>
-          <a:p>
-            <a:pPr marL="417513" lvl="2" indent="0">
-              <a:spcBef>
-                <a:spcPts val="0"/>
-              </a:spcBef>
-              <a:buNone/>
-            </a:pPr>
-            <a:br>
-              <a:rPr lang="en-US" altLang="ko-KR" sz="900" dirty="0">
-                <a:solidFill>
-                  <a:srgbClr val="000000"/>
-                </a:solidFill>
-                <a:effectLst/>
-                <a:latin typeface="Consolas" panose="020B0609020204030204" pitchFamily="49" charset="0"/>
-              </a:rPr>
-            </a:br>
-            <a:endParaRPr lang="en-US" altLang="ko-KR" sz="900" dirty="0">
-              <a:solidFill>
-                <a:srgbClr val="000000"/>
-              </a:solidFill>
-              <a:effectLst/>
-              <a:latin typeface="Consolas" panose="020B0609020204030204" pitchFamily="49" charset="0"/>
-            </a:endParaRPr>
-          </a:p>
-          <a:p>
-            <a:endParaRPr lang="en-US" altLang="ko-KR" sz="2000" dirty="0"/>
-          </a:p>
-          <a:p>
-            <a:endParaRPr lang="en-US" altLang="ko-KR" sz="2000" dirty="0"/>
-          </a:p>
-          <a:p>
-            <a:endParaRPr lang="en-US" altLang="ko-KR" sz="2000" dirty="0"/>
-          </a:p>
-          <a:p>
-            <a:r>
-              <a:rPr lang="en-US" altLang="ko-KR" sz="2000" dirty="0" err="1"/>
-              <a:t>fsdata.c</a:t>
-            </a:r>
-            <a:r>
-              <a:rPr lang="ko-KR" altLang="en-US" sz="2000" dirty="0"/>
-              <a:t>를 </a:t>
-            </a:r>
-            <a:r>
-              <a:rPr lang="en-US" altLang="ko-KR" sz="2000" dirty="0" err="1"/>
-              <a:t>Middlewares</a:t>
-            </a:r>
-            <a:r>
-              <a:rPr lang="en-US" altLang="ko-KR" sz="2000" dirty="0"/>
-              <a:t> -&gt; </a:t>
-            </a:r>
-            <a:r>
-              <a:rPr lang="en-US" altLang="ko-KR" sz="2000" dirty="0" err="1"/>
-              <a:t>Third_Party</a:t>
-            </a:r>
-            <a:r>
-              <a:rPr lang="en-US" altLang="ko-KR" sz="2000" dirty="0"/>
-              <a:t> -&gt; </a:t>
-            </a:r>
-            <a:r>
-              <a:rPr lang="en-US" altLang="ko-KR" sz="2000" dirty="0" err="1"/>
-              <a:t>LwIP</a:t>
-            </a:r>
-            <a:r>
-              <a:rPr lang="en-US" altLang="ko-KR" sz="2000" dirty="0"/>
-              <a:t> -&gt; </a:t>
-            </a:r>
-            <a:r>
-              <a:rPr lang="en-US" altLang="ko-KR" sz="2000" dirty="0" err="1"/>
-              <a:t>src</a:t>
-            </a:r>
-            <a:r>
-              <a:rPr lang="en-US" altLang="ko-KR" sz="2000" dirty="0"/>
-              <a:t> -&gt; apps -&gt; httpd </a:t>
-            </a:r>
-            <a:r>
-              <a:rPr lang="ko-KR" altLang="en-US" sz="2000" dirty="0"/>
-              <a:t>폴더에 복사</a:t>
-            </a:r>
-            <a:r>
-              <a:rPr lang="en-US" altLang="ko-KR" sz="2000" dirty="0"/>
-              <a:t>.</a:t>
-            </a:r>
-          </a:p>
-        </p:txBody>
-      </p:sp>
-      <p:pic>
-        <p:nvPicPr>
-          <p:cNvPr id="6" name="그림 5">
-            <a:extLst>
-              <a:ext uri="{FF2B5EF4-FFF2-40B4-BE49-F238E27FC236}">
-                <a16:creationId xmlns:a16="http://schemas.microsoft.com/office/drawing/2014/main" id="{372B225C-D429-1FCE-8B32-BEAC0DAAC941}"/>
-              </a:ext>
-            </a:extLst>
-          </p:cNvPr>
-          <p:cNvPicPr>
-            <a:picLocks noChangeAspect="1"/>
-          </p:cNvPicPr>
-          <p:nvPr/>
-        </p:nvPicPr>
-        <p:blipFill>
-          <a:blip r:embed="rId2"/>
-          <a:stretch>
-            <a:fillRect/>
-          </a:stretch>
-        </p:blipFill>
-        <p:spPr>
-          <a:xfrm>
-            <a:off x="568152" y="1700808"/>
-            <a:ext cx="8028384" cy="1041104"/>
-          </a:xfrm>
-          <a:prstGeom prst="rect">
-            <a:avLst/>
-          </a:prstGeom>
-        </p:spPr>
-      </p:pic>
-      <p:graphicFrame>
-        <p:nvGraphicFramePr>
-          <p:cNvPr id="11" name="개체 10">
-            <a:extLst>
-              <a:ext uri="{FF2B5EF4-FFF2-40B4-BE49-F238E27FC236}">
-                <a16:creationId xmlns:a16="http://schemas.microsoft.com/office/drawing/2014/main" id="{9C244748-1F6B-30E0-97F6-05C1725D983B}"/>
-              </a:ext>
-            </a:extLst>
-          </p:cNvPr>
-          <p:cNvGraphicFramePr>
-            <a:graphicFrameLocks noChangeAspect="1"/>
-          </p:cNvGraphicFramePr>
-          <p:nvPr>
-            <p:extLst>
-              <p:ext uri="{D42A27DB-BD31-4B8C-83A1-F6EECF244321}">
-                <p14:modId xmlns:p14="http://schemas.microsoft.com/office/powerpoint/2010/main" val="3014885191"/>
-              </p:ext>
-            </p:extLst>
-          </p:nvPr>
-        </p:nvGraphicFramePr>
-        <p:xfrm>
-          <a:off x="827584" y="3972407"/>
-          <a:ext cx="438150" cy="592138"/>
-        </p:xfrm>
-        <a:graphic>
-          <a:graphicData uri="http://schemas.openxmlformats.org/presentationml/2006/ole">
-            <mc:AlternateContent xmlns:mc="http://schemas.openxmlformats.org/markup-compatibility/2006">
-              <mc:Choice xmlns:v="urn:schemas-microsoft-com:vml" Requires="v">
-                <p:oleObj name="포장기 셸 개체" showAsIcon="1" r:id="rId3" imgW="438840" imgH="591480" progId="Package">
-                  <p:embed/>
-                </p:oleObj>
-              </mc:Choice>
-              <mc:Fallback>
-                <p:oleObj name="포장기 셸 개체" showAsIcon="1" r:id="rId3" imgW="438840" imgH="591480" progId="Package">
-                  <p:embed/>
-                  <p:pic>
-                    <p:nvPicPr>
-                      <p:cNvPr id="0" name=""/>
-                      <p:cNvPicPr/>
-                      <p:nvPr/>
-                    </p:nvPicPr>
-                    <p:blipFill>
-                      <a:blip r:embed="rId4"/>
-                      <a:stretch>
-                        <a:fillRect/>
-                      </a:stretch>
-                    </p:blipFill>
-                    <p:spPr>
-                      <a:xfrm>
-                        <a:off x="827584" y="3972407"/>
-                        <a:ext cx="438150" cy="592138"/>
-                      </a:xfrm>
-                      <a:prstGeom prst="rect">
-                        <a:avLst/>
-                      </a:prstGeom>
-                    </p:spPr>
-                  </p:pic>
-                </p:oleObj>
-              </mc:Fallback>
-            </mc:AlternateContent>
-          </a:graphicData>
-        </a:graphic>
-      </p:graphicFrame>
-    </p:spTree>
-    <p:extLst>
-      <p:ext uri="{BB962C8B-B14F-4D97-AF65-F5344CB8AC3E}">
-        <p14:creationId xmlns:p14="http://schemas.microsoft.com/office/powerpoint/2010/main" val="4017538619"/>
       </p:ext>
     </p:extLst>
   </p:cSld>

</xml_diff>